<commit_message>
MIDTERMS PRESENTATION / sup mtg meeting
</commit_message>
<xml_diff>
--- a/Documentation/Wiki Documents/5. DOCUMENTATION/Diagrams/Use Case/Use Case.pptx
+++ b/Documentation/Wiki Documents/5. DOCUMENTATION/Diagrams/Use Case/Use Case.pptx
@@ -104,6 +104,11 @@
       </a:defRPr>
     </a:lvl9pPr>
   </p:defaultTextStyle>
+  <p:extLst>
+    <p:ext uri="{EFAFB233-063F-42B5-8137-9DF3F51BA10A}">
+      <p15:sldGuideLst xmlns:p15="http://schemas.microsoft.com/office/powerpoint/2012/main"/>
+    </p:ext>
+  </p:extLst>
 </p:presentation>
 </file>
 
@@ -238,7 +243,7 @@
           <a:p>
             <a:fld id="{9A9F22A0-5D52-4E2D-B578-DF1AFCFC8292}" type="datetimeFigureOut">
               <a:rPr lang="en-US" smtClean="0"/>
-              <a:t>12/27/2016</a:t>
+              <a:t>2/21/2017</a:t>
             </a:fld>
             <a:endParaRPr lang="en-US"/>
           </a:p>
@@ -408,7 +413,7 @@
           <a:p>
             <a:fld id="{9A9F22A0-5D52-4E2D-B578-DF1AFCFC8292}" type="datetimeFigureOut">
               <a:rPr lang="en-US" smtClean="0"/>
-              <a:t>12/27/2016</a:t>
+              <a:t>2/21/2017</a:t>
             </a:fld>
             <a:endParaRPr lang="en-US"/>
           </a:p>
@@ -588,7 +593,7 @@
           <a:p>
             <a:fld id="{9A9F22A0-5D52-4E2D-B578-DF1AFCFC8292}" type="datetimeFigureOut">
               <a:rPr lang="en-US" smtClean="0"/>
-              <a:t>12/27/2016</a:t>
+              <a:t>2/21/2017</a:t>
             </a:fld>
             <a:endParaRPr lang="en-US"/>
           </a:p>
@@ -758,7 +763,7 @@
           <a:p>
             <a:fld id="{9A9F22A0-5D52-4E2D-B578-DF1AFCFC8292}" type="datetimeFigureOut">
               <a:rPr lang="en-US" smtClean="0"/>
-              <a:t>12/27/2016</a:t>
+              <a:t>2/21/2017</a:t>
             </a:fld>
             <a:endParaRPr lang="en-US"/>
           </a:p>
@@ -1002,7 +1007,7 @@
           <a:p>
             <a:fld id="{9A9F22A0-5D52-4E2D-B578-DF1AFCFC8292}" type="datetimeFigureOut">
               <a:rPr lang="en-US" smtClean="0"/>
-              <a:t>12/27/2016</a:t>
+              <a:t>2/21/2017</a:t>
             </a:fld>
             <a:endParaRPr lang="en-US"/>
           </a:p>
@@ -1234,7 +1239,7 @@
           <a:p>
             <a:fld id="{9A9F22A0-5D52-4E2D-B578-DF1AFCFC8292}" type="datetimeFigureOut">
               <a:rPr lang="en-US" smtClean="0"/>
-              <a:t>12/27/2016</a:t>
+              <a:t>2/21/2017</a:t>
             </a:fld>
             <a:endParaRPr lang="en-US"/>
           </a:p>
@@ -1601,7 +1606,7 @@
           <a:p>
             <a:fld id="{9A9F22A0-5D52-4E2D-B578-DF1AFCFC8292}" type="datetimeFigureOut">
               <a:rPr lang="en-US" smtClean="0"/>
-              <a:t>12/27/2016</a:t>
+              <a:t>2/21/2017</a:t>
             </a:fld>
             <a:endParaRPr lang="en-US"/>
           </a:p>
@@ -1719,7 +1724,7 @@
           <a:p>
             <a:fld id="{9A9F22A0-5D52-4E2D-B578-DF1AFCFC8292}" type="datetimeFigureOut">
               <a:rPr lang="en-US" smtClean="0"/>
-              <a:t>12/27/2016</a:t>
+              <a:t>2/21/2017</a:t>
             </a:fld>
             <a:endParaRPr lang="en-US"/>
           </a:p>
@@ -1814,7 +1819,7 @@
           <a:p>
             <a:fld id="{9A9F22A0-5D52-4E2D-B578-DF1AFCFC8292}" type="datetimeFigureOut">
               <a:rPr lang="en-US" smtClean="0"/>
-              <a:t>12/27/2016</a:t>
+              <a:t>2/21/2017</a:t>
             </a:fld>
             <a:endParaRPr lang="en-US"/>
           </a:p>
@@ -2091,7 +2096,7 @@
           <a:p>
             <a:fld id="{9A9F22A0-5D52-4E2D-B578-DF1AFCFC8292}" type="datetimeFigureOut">
               <a:rPr lang="en-US" smtClean="0"/>
-              <a:t>12/27/2016</a:t>
+              <a:t>2/21/2017</a:t>
             </a:fld>
             <a:endParaRPr lang="en-US"/>
           </a:p>
@@ -2348,7 +2353,7 @@
           <a:p>
             <a:fld id="{9A9F22A0-5D52-4E2D-B578-DF1AFCFC8292}" type="datetimeFigureOut">
               <a:rPr lang="en-US" smtClean="0"/>
-              <a:t>12/27/2016</a:t>
+              <a:t>2/21/2017</a:t>
             </a:fld>
             <a:endParaRPr lang="en-US"/>
           </a:p>
@@ -2561,7 +2566,7 @@
           <a:p>
             <a:fld id="{9A9F22A0-5D52-4E2D-B578-DF1AFCFC8292}" type="datetimeFigureOut">
               <a:rPr lang="en-US" smtClean="0"/>
-              <a:t>12/27/2016</a:t>
+              <a:t>2/21/2017</a:t>
             </a:fld>
             <a:endParaRPr lang="en-US"/>
           </a:p>
@@ -2974,8 +2979,8 @@
         </p:nvSpPr>
         <p:spPr>
           <a:xfrm>
-            <a:off x="368599" y="310861"/>
-            <a:ext cx="2080166" cy="440195"/>
+            <a:off x="399650" y="306264"/>
+            <a:ext cx="2080166" cy="1026330"/>
           </a:xfrm>
           <a:prstGeom prst="roundRect">
             <a:avLst/>
@@ -3012,12 +3017,120 @@
           <a:lstStyle/>
           <a:p>
             <a:r>
-              <a:rPr lang="en-US" sz="1000" dirty="0">
-                <a:solidFill>
-                  <a:schemeClr val="tx1"/>
-                </a:solidFill>
-              </a:rPr>
-              <a:t>Upload excel file (patient data) exported from Zoho CRM</a:t>
+              <a:rPr lang="en-US" sz="800" u="sng" dirty="0">
+                <a:solidFill>
+                  <a:schemeClr val="bg2">
+                    <a:lumMod val="10000"/>
+                  </a:schemeClr>
+                </a:solidFill>
+              </a:rPr>
+              <a:t>Data Management</a:t>
+            </a:r>
+            <a:r>
+              <a:rPr lang="en-US" sz="800" dirty="0">
+                <a:solidFill>
+                  <a:schemeClr val="bg2">
+                    <a:lumMod val="10000"/>
+                  </a:schemeClr>
+                </a:solidFill>
+              </a:rPr>
+              <a:t> </a:t>
+            </a:r>
+          </a:p>
+          <a:p>
+            <a:pPr marL="171450" indent="-171450">
+              <a:buFont typeface="Arial" panose="020B0604020202020204" pitchFamily="34" charset="0"/>
+              <a:buChar char="•"/>
+            </a:pPr>
+            <a:r>
+              <a:rPr lang="en-US" sz="800" dirty="0">
+                <a:solidFill>
+                  <a:schemeClr val="bg2">
+                    <a:lumMod val="10000"/>
+                  </a:schemeClr>
+                </a:solidFill>
+              </a:rPr>
+              <a:t>Upload excel file (client data) exported from Zoho CRM</a:t>
+            </a:r>
+          </a:p>
+          <a:p>
+            <a:pPr marL="171450" indent="-171450">
+              <a:buFont typeface="Arial" panose="020B0604020202020204" pitchFamily="34" charset="0"/>
+              <a:buChar char="•"/>
+            </a:pPr>
+            <a:r>
+              <a:rPr lang="en-US" sz="800" dirty="0">
+                <a:solidFill>
+                  <a:schemeClr val="bg2">
+                    <a:lumMod val="10000"/>
+                  </a:schemeClr>
+                </a:solidFill>
+              </a:rPr>
+              <a:t>Add on to existing database</a:t>
+            </a:r>
+          </a:p>
+          <a:p>
+            <a:pPr marL="171450" indent="-171450">
+              <a:buFont typeface="Arial" panose="020B0604020202020204" pitchFamily="34" charset="0"/>
+              <a:buChar char="•"/>
+            </a:pPr>
+            <a:r>
+              <a:rPr lang="en-US" sz="800" dirty="0">
+                <a:solidFill>
+                  <a:schemeClr val="bg2">
+                    <a:lumMod val="10000"/>
+                  </a:schemeClr>
+                </a:solidFill>
+              </a:rPr>
+              <a:t>Display clients’ list</a:t>
+            </a:r>
+          </a:p>
+          <a:p>
+            <a:pPr marL="171450" indent="-171450">
+              <a:buFont typeface="Arial" panose="020B0604020202020204" pitchFamily="34" charset="0"/>
+              <a:buChar char="•"/>
+            </a:pPr>
+            <a:r>
+              <a:rPr lang="en-US" sz="800" dirty="0">
+                <a:solidFill>
+                  <a:schemeClr val="bg2">
+                    <a:lumMod val="10000"/>
+                  </a:schemeClr>
+                </a:solidFill>
+              </a:rPr>
+              <a:t>Search client</a:t>
+            </a:r>
+          </a:p>
+          <a:p>
+            <a:pPr marL="171450" indent="-171450">
+              <a:buFont typeface="Arial" panose="020B0604020202020204" pitchFamily="34" charset="0"/>
+              <a:buChar char="•"/>
+            </a:pPr>
+            <a:r>
+              <a:rPr lang="en-US" sz="800" dirty="0">
+                <a:solidFill>
+                  <a:schemeClr val="bg2">
+                    <a:lumMod val="10000"/>
+                  </a:schemeClr>
+                </a:solidFill>
+              </a:rPr>
+              <a:t>Sort clients</a:t>
+            </a:r>
+          </a:p>
+          <a:p>
+            <a:pPr marL="171450" indent="-171450">
+              <a:buFont typeface="Arial" panose="020B0604020202020204" pitchFamily="34" charset="0"/>
+              <a:buChar char="•"/>
+            </a:pPr>
+            <a:r>
+              <a:rPr lang="en-US" sz="800" dirty="0">
+                <a:solidFill>
+                  <a:schemeClr val="bg2">
+                    <a:lumMod val="10000"/>
+                  </a:schemeClr>
+                </a:solidFill>
+              </a:rPr>
+              <a:t>View Client Profile</a:t>
             </a:r>
           </a:p>
         </p:txBody>
@@ -3030,8 +3143,8 @@
         </p:nvSpPr>
         <p:spPr>
           <a:xfrm>
-            <a:off x="2938593" y="348248"/>
-            <a:ext cx="3026117" cy="1048986"/>
+            <a:off x="3027112" y="339554"/>
+            <a:ext cx="2907510" cy="864165"/>
           </a:xfrm>
           <a:prstGeom prst="roundRect">
             <a:avLst/>
@@ -3074,62 +3187,56 @@
           <a:lstStyle/>
           <a:p>
             <a:r>
-              <a:rPr lang="en-US" sz="1000" dirty="0">
-                <a:solidFill>
-                  <a:sysClr val="windowText" lastClr="000000"/>
-                </a:solidFill>
-              </a:rPr>
-              <a:t>Create Screening</a:t>
-            </a:r>
-          </a:p>
-          <a:p>
-            <a:r>
-              <a:rPr lang="en-US" sz="1000" dirty="0">
-                <a:solidFill>
-                  <a:sysClr val="windowText" lastClr="000000"/>
-                </a:solidFill>
-              </a:rPr>
-              <a:t>View Screenings</a:t>
-            </a:r>
-          </a:p>
-          <a:p>
-            <a:r>
-              <a:rPr lang="en-US" sz="1000" dirty="0">
-                <a:solidFill>
-                  <a:sysClr val="windowText" lastClr="000000"/>
-                </a:solidFill>
-              </a:rPr>
-              <a:t>Update Screening</a:t>
-            </a:r>
-          </a:p>
-          <a:p>
-            <a:r>
-              <a:rPr lang="en-US" sz="1000" dirty="0">
-                <a:solidFill>
-                  <a:sysClr val="windowText" lastClr="000000"/>
-                </a:solidFill>
-              </a:rPr>
-              <a:t>Delete Screening</a:t>
-            </a:r>
-          </a:p>
-          <a:p>
-            <a:r>
-              <a:rPr lang="en-US" sz="1000" dirty="0">
-                <a:solidFill>
-                  <a:sysClr val="windowText" lastClr="000000"/>
-                </a:solidFill>
-              </a:rPr>
-              <a:t>Sort Screenings (demographics, age range)</a:t>
-            </a:r>
-          </a:p>
-          <a:p>
-            <a:r>
-              <a:rPr lang="en-US" sz="1000" dirty="0">
-                <a:solidFill>
-                  <a:sysClr val="windowText" lastClr="000000"/>
-                </a:solidFill>
-              </a:rPr>
-              <a:t>Group patients by age for recommended screenings</a:t>
+              <a:rPr lang="en-US" sz="800" u="sng" dirty="0">
+                <a:solidFill>
+                  <a:schemeClr val="bg2">
+                    <a:lumMod val="10000"/>
+                  </a:schemeClr>
+                </a:solidFill>
+              </a:rPr>
+              <a:t>Email Notification</a:t>
+            </a:r>
+            <a:r>
+              <a:rPr lang="en-US" sz="800" dirty="0">
+                <a:solidFill>
+                  <a:schemeClr val="bg2">
+                    <a:lumMod val="10000"/>
+                  </a:schemeClr>
+                </a:solidFill>
+              </a:rPr>
+              <a:t> </a:t>
+            </a:r>
+          </a:p>
+          <a:p>
+            <a:pPr marL="171450" indent="-171450">
+              <a:buFont typeface="Arial" panose="020B0604020202020204" pitchFamily="34" charset="0"/>
+              <a:buChar char="•"/>
+            </a:pPr>
+            <a:r>
+              <a:rPr lang="en-US" sz="800" dirty="0">
+                <a:solidFill>
+                  <a:schemeClr val="bg2">
+                    <a:lumMod val="10000"/>
+                  </a:schemeClr>
+                </a:solidFill>
+              </a:rPr>
+              <a:t>Send email to specified recipients based on selected patients for specific screenings</a:t>
+            </a:r>
+          </a:p>
+          <a:p>
+            <a:pPr marL="171450" indent="-171450">
+              <a:buFont typeface="Arial" panose="020B0604020202020204" pitchFamily="34" charset="0"/>
+              <a:buChar char="•"/>
+            </a:pPr>
+            <a:r>
+              <a:rPr lang="en-US" sz="800" dirty="0">
+                <a:solidFill>
+                  <a:schemeClr val="bg2">
+                    <a:lumMod val="10000"/>
+                  </a:schemeClr>
+                </a:solidFill>
+              </a:rPr>
+              <a:t>Retrieve database values to auto-populate pre-defined tags in email template in sent email</a:t>
             </a:r>
           </a:p>
         </p:txBody>
@@ -3142,8 +3249,8 @@
         </p:nvSpPr>
         <p:spPr>
           <a:xfrm>
-            <a:off x="362091" y="1026942"/>
-            <a:ext cx="2117725" cy="653903"/>
+            <a:off x="399650" y="1519587"/>
+            <a:ext cx="2117725" cy="1464605"/>
           </a:xfrm>
           <a:prstGeom prst="roundRect">
             <a:avLst/>
@@ -3186,12 +3293,158 @@
           <a:lstStyle/>
           <a:p>
             <a:r>
-              <a:rPr lang="en-US" sz="1000" dirty="0">
-                <a:solidFill>
-                  <a:sysClr val="windowText" lastClr="000000"/>
-                </a:solidFill>
-              </a:rPr>
-              <a:t>View analysis infographic of Gender and Age breakdown</a:t>
+              <a:rPr lang="en-US" sz="800" u="sng" dirty="0">
+                <a:solidFill>
+                  <a:schemeClr val="bg2">
+                    <a:lumMod val="10000"/>
+                  </a:schemeClr>
+                </a:solidFill>
+              </a:rPr>
+              <a:t>Screenings</a:t>
+            </a:r>
+          </a:p>
+          <a:p>
+            <a:pPr marL="171450" indent="-171450">
+              <a:buFont typeface="Arial" panose="020B0604020202020204" pitchFamily="34" charset="0"/>
+              <a:buChar char="•"/>
+            </a:pPr>
+            <a:r>
+              <a:rPr lang="en-US" sz="800" dirty="0">
+                <a:solidFill>
+                  <a:schemeClr val="bg2">
+                    <a:lumMod val="10000"/>
+                  </a:schemeClr>
+                </a:solidFill>
+              </a:rPr>
+              <a:t>Create Screening</a:t>
+            </a:r>
+          </a:p>
+          <a:p>
+            <a:pPr marL="171450" indent="-171450">
+              <a:buFont typeface="Arial" panose="020B0604020202020204" pitchFamily="34" charset="0"/>
+              <a:buChar char="•"/>
+            </a:pPr>
+            <a:r>
+              <a:rPr lang="en-US" sz="800" dirty="0">
+                <a:solidFill>
+                  <a:schemeClr val="bg2">
+                    <a:lumMod val="10000"/>
+                  </a:schemeClr>
+                </a:solidFill>
+              </a:rPr>
+              <a:t>View Screenings</a:t>
+            </a:r>
+          </a:p>
+          <a:p>
+            <a:pPr marL="171450" indent="-171450">
+              <a:buFont typeface="Arial" panose="020B0604020202020204" pitchFamily="34" charset="0"/>
+              <a:buChar char="•"/>
+            </a:pPr>
+            <a:r>
+              <a:rPr lang="en-US" sz="800" dirty="0">
+                <a:solidFill>
+                  <a:schemeClr val="bg2">
+                    <a:lumMod val="10000"/>
+                  </a:schemeClr>
+                </a:solidFill>
+              </a:rPr>
+              <a:t>Update Screening</a:t>
+            </a:r>
+          </a:p>
+          <a:p>
+            <a:pPr marL="171450" indent="-171450">
+              <a:buFont typeface="Arial" panose="020B0604020202020204" pitchFamily="34" charset="0"/>
+              <a:buChar char="•"/>
+            </a:pPr>
+            <a:r>
+              <a:rPr lang="en-US" sz="800" dirty="0">
+                <a:solidFill>
+                  <a:schemeClr val="bg2">
+                    <a:lumMod val="10000"/>
+                  </a:schemeClr>
+                </a:solidFill>
+              </a:rPr>
+              <a:t>Delete Screening</a:t>
+            </a:r>
+          </a:p>
+          <a:p>
+            <a:pPr marL="171450" indent="-171450">
+              <a:buFont typeface="Arial" panose="020B0604020202020204" pitchFamily="34" charset="0"/>
+              <a:buChar char="•"/>
+            </a:pPr>
+            <a:r>
+              <a:rPr lang="en-US" sz="800" dirty="0">
+                <a:solidFill>
+                  <a:schemeClr val="bg2">
+                    <a:lumMod val="10000"/>
+                  </a:schemeClr>
+                </a:solidFill>
+              </a:rPr>
+              <a:t>Sort Screenings </a:t>
+            </a:r>
+          </a:p>
+          <a:p>
+            <a:pPr marL="171450" indent="-171450">
+              <a:buFont typeface="Arial" panose="020B0604020202020204" pitchFamily="34" charset="0"/>
+              <a:buChar char="•"/>
+            </a:pPr>
+            <a:r>
+              <a:rPr lang="en-US" sz="800" dirty="0">
+                <a:solidFill>
+                  <a:schemeClr val="bg2">
+                    <a:lumMod val="10000"/>
+                  </a:schemeClr>
+                </a:solidFill>
+              </a:rPr>
+              <a:t>Search Screening</a:t>
+            </a:r>
+          </a:p>
+          <a:p>
+            <a:pPr marL="171450" indent="-171450">
+              <a:buFont typeface="Arial" panose="020B0604020202020204" pitchFamily="34" charset="0"/>
+              <a:buChar char="•"/>
+            </a:pPr>
+            <a:r>
+              <a:rPr lang="en-US" sz="800" dirty="0">
+                <a:solidFill>
+                  <a:schemeClr val="bg2">
+                    <a:lumMod val="10000"/>
+                  </a:schemeClr>
+                </a:solidFill>
+              </a:rPr>
+              <a:t>Group patients by recommended screening</a:t>
+            </a:r>
+          </a:p>
+          <a:p>
+            <a:pPr marL="171450" indent="-171450">
+              <a:buFont typeface="Arial" panose="020B0604020202020204" pitchFamily="34" charset="0"/>
+              <a:buChar char="•"/>
+            </a:pPr>
+            <a:r>
+              <a:rPr lang="en-US" sz="800" dirty="0">
+                <a:solidFill>
+                  <a:schemeClr val="bg2">
+                    <a:lumMod val="10000"/>
+                  </a:schemeClr>
+                </a:solidFill>
+              </a:rPr>
+              <a:t>Email sent’ column for clients list</a:t>
+            </a:r>
+          </a:p>
+          <a:p>
+            <a:pPr marL="171450" indent="-171450">
+              <a:buFont typeface="Arial" panose="020B0604020202020204" pitchFamily="34" charset="0"/>
+              <a:buChar char="•"/>
+            </a:pPr>
+            <a:r>
+              <a:rPr lang="en-US" sz="800" dirty="0">
+                <a:solidFill>
+                  <a:schemeClr val="bg2">
+                    <a:lumMod val="10000"/>
+                  </a:schemeClr>
+                </a:solidFill>
+              </a:rPr>
+              <a:t>Filter by follow-up person </a:t>
             </a:r>
           </a:p>
         </p:txBody>
@@ -3204,7 +3457,7 @@
         </p:nvSpPr>
         <p:spPr>
           <a:xfrm>
-            <a:off x="403777" y="3643018"/>
+            <a:off x="620684" y="3175086"/>
             <a:ext cx="886619" cy="332634"/>
           </a:xfrm>
           <a:prstGeom prst="roundRect">
@@ -3266,8 +3519,8 @@
         </p:nvSpPr>
         <p:spPr>
           <a:xfrm>
-            <a:off x="403777" y="1886864"/>
-            <a:ext cx="2044988" cy="733678"/>
+            <a:off x="6371786" y="271160"/>
+            <a:ext cx="1906888" cy="1637894"/>
           </a:xfrm>
           <a:prstGeom prst="roundRect">
             <a:avLst/>
@@ -3307,111 +3560,152 @@
           <a:lstStyle/>
           <a:p>
             <a:r>
-              <a:rPr lang="en-US" sz="1000" dirty="0">
-                <a:solidFill>
-                  <a:schemeClr val="tx1"/>
-                </a:solidFill>
-              </a:rPr>
-              <a:t>Upload email templates</a:t>
-            </a:r>
-          </a:p>
-          <a:p>
-            <a:r>
-              <a:rPr lang="en-US" sz="1000" dirty="0">
-                <a:solidFill>
-                  <a:schemeClr val="tx1"/>
-                </a:solidFill>
-              </a:rPr>
-              <a:t>for screening reminder</a:t>
-            </a:r>
-          </a:p>
-          <a:p>
-            <a:r>
-              <a:rPr lang="en-US" sz="1000" dirty="0">
-                <a:solidFill>
-                  <a:schemeClr val="tx1"/>
-                </a:solidFill>
-              </a:rPr>
-              <a:t>View archived email templates</a:t>
-            </a:r>
-          </a:p>
-          <a:p>
-            <a:r>
-              <a:rPr lang="en-US" sz="1000" dirty="0">
-                <a:solidFill>
-                  <a:schemeClr val="tx1"/>
-                </a:solidFill>
-              </a:rPr>
-              <a:t>Edit archived email templates</a:t>
-            </a:r>
-          </a:p>
-        </p:txBody>
-      </p:sp>
-      <p:sp>
-        <p:nvSpPr>
-          <p:cNvPr id="10" name="Rounded Rectangle 9"/>
-          <p:cNvSpPr/>
-          <p:nvPr/>
-        </p:nvSpPr>
-        <p:spPr>
-          <a:xfrm>
-            <a:off x="6229603" y="1695329"/>
-            <a:ext cx="2065334" cy="570793"/>
-          </a:xfrm>
-          <a:prstGeom prst="roundRect">
-            <a:avLst/>
-          </a:prstGeom>
-          <a:solidFill>
-            <a:srgbClr val="D78EE6"/>
-          </a:solidFill>
-          <a:ln>
-            <a:solidFill>
-              <a:schemeClr val="tx1"/>
-            </a:solidFill>
-          </a:ln>
-        </p:spPr>
-        <p:style>
-          <a:lnRef idx="2">
-            <a:schemeClr val="accent1">
-              <a:shade val="50000"/>
-            </a:schemeClr>
-          </a:lnRef>
-          <a:fillRef idx="1">
-            <a:schemeClr val="accent1"/>
-          </a:fillRef>
-          <a:effectRef idx="0">
-            <a:schemeClr val="accent1"/>
-          </a:effectRef>
-          <a:fontRef idx="minor">
-            <a:schemeClr val="lt1"/>
-          </a:fontRef>
-        </p:style>
-        <p:txBody>
-          <a:bodyPr rot="0" spcFirstLastPara="0" vertOverflow="overflow" horzOverflow="overflow" vert="horz" wrap="square" lIns="68580" tIns="34290" rIns="68580" bIns="34290" numCol="1" spcCol="0" rtlCol="0" fromWordArt="0" anchor="ctr" anchorCtr="0" forceAA="0" compatLnSpc="1">
-            <a:prstTxWarp prst="textNoShape">
-              <a:avLst/>
-            </a:prstTxWarp>
-            <a:noAutofit/>
-          </a:bodyPr>
-          <a:lstStyle/>
-          <a:p>
-            <a:r>
-              <a:rPr lang="en-US" sz="1000" dirty="0">
-                <a:solidFill>
-                  <a:sysClr val="windowText" lastClr="000000"/>
-                </a:solidFill>
-              </a:rPr>
-              <a:t>View analysis infographic - Ranking</a:t>
-            </a:r>
-          </a:p>
-          <a:p>
-            <a:r>
-              <a:rPr lang="en-US" sz="1000" dirty="0">
-                <a:solidFill>
-                  <a:sysClr val="windowText" lastClr="000000"/>
-                </a:solidFill>
-              </a:rPr>
-              <a:t>Filter (Doctors/Specialty/Referral)</a:t>
+              <a:rPr lang="en-US" sz="800" u="sng" dirty="0">
+                <a:solidFill>
+                  <a:schemeClr val="bg2">
+                    <a:lumMod val="10000"/>
+                  </a:schemeClr>
+                </a:solidFill>
+              </a:rPr>
+              <a:t>Reports</a:t>
+            </a:r>
+            <a:r>
+              <a:rPr lang="en-US" sz="800" dirty="0">
+                <a:solidFill>
+                  <a:schemeClr val="bg2">
+                    <a:lumMod val="10000"/>
+                  </a:schemeClr>
+                </a:solidFill>
+              </a:rPr>
+              <a:t> </a:t>
+            </a:r>
+          </a:p>
+          <a:p>
+            <a:pPr marL="171450" indent="-171450">
+              <a:buFont typeface="Arial" panose="020B0604020202020204" pitchFamily="34" charset="0"/>
+              <a:buChar char="•"/>
+            </a:pPr>
+            <a:r>
+              <a:rPr lang="en-US" sz="800" dirty="0">
+                <a:solidFill>
+                  <a:schemeClr val="bg2">
+                    <a:lumMod val="10000"/>
+                  </a:schemeClr>
+                </a:solidFill>
+              </a:rPr>
+              <a:t>Display Gender and Age breakdown</a:t>
+            </a:r>
+          </a:p>
+          <a:p>
+            <a:pPr marL="171450" indent="-171450">
+              <a:buFont typeface="Arial" panose="020B0604020202020204" pitchFamily="34" charset="0"/>
+              <a:buChar char="•"/>
+            </a:pPr>
+            <a:r>
+              <a:rPr lang="en-US" sz="800" dirty="0">
+                <a:solidFill>
+                  <a:schemeClr val="bg2">
+                    <a:lumMod val="10000"/>
+                  </a:schemeClr>
+                </a:solidFill>
+              </a:rPr>
+              <a:t>Filter (Doctor/Specialty/Referral)</a:t>
+            </a:r>
+          </a:p>
+          <a:p>
+            <a:pPr marL="171450" indent="-171450">
+              <a:buFont typeface="Arial" panose="020B0604020202020204" pitchFamily="34" charset="0"/>
+              <a:buChar char="•"/>
+            </a:pPr>
+            <a:r>
+              <a:rPr lang="en-US" sz="800" dirty="0">
+                <a:solidFill>
+                  <a:schemeClr val="bg2">
+                    <a:lumMod val="10000"/>
+                  </a:schemeClr>
+                </a:solidFill>
+              </a:rPr>
+              <a:t>Display ranking</a:t>
+            </a:r>
+          </a:p>
+          <a:p>
+            <a:pPr marL="171450" indent="-171450">
+              <a:buFont typeface="Arial" panose="020B0604020202020204" pitchFamily="34" charset="0"/>
+              <a:buChar char="•"/>
+            </a:pPr>
+            <a:r>
+              <a:rPr lang="en-US" sz="800" dirty="0">
+                <a:solidFill>
+                  <a:schemeClr val="bg2">
+                    <a:lumMod val="10000"/>
+                  </a:schemeClr>
+                </a:solidFill>
+              </a:rPr>
+              <a:t>Filter (Visa/ Medical Team)</a:t>
+            </a:r>
+          </a:p>
+          <a:p>
+            <a:pPr marL="171450" indent="-171450">
+              <a:buFont typeface="Arial" panose="020B0604020202020204" pitchFamily="34" charset="0"/>
+              <a:buChar char="•"/>
+            </a:pPr>
+            <a:r>
+              <a:rPr lang="en-US" sz="800" dirty="0">
+                <a:solidFill>
+                  <a:schemeClr val="bg2">
+                    <a:lumMod val="10000"/>
+                  </a:schemeClr>
+                </a:solidFill>
+              </a:rPr>
+              <a:t>Display analysis infographic</a:t>
+            </a:r>
+          </a:p>
+          <a:p>
+            <a:pPr marL="171450" indent="-171450">
+              <a:buFont typeface="Arial" panose="020B0604020202020204" pitchFamily="34" charset="0"/>
+              <a:buChar char="•"/>
+            </a:pPr>
+            <a:r>
+              <a:rPr lang="en-US" sz="800" dirty="0">
+                <a:solidFill>
+                  <a:schemeClr val="bg2">
+                    <a:lumMod val="10000"/>
+                  </a:schemeClr>
+                </a:solidFill>
+              </a:rPr>
+              <a:t>Show changes from previous month/year</a:t>
+            </a:r>
+          </a:p>
+          <a:p>
+            <a:pPr marL="171450" indent="-171450">
+              <a:buFont typeface="Arial" panose="020B0604020202020204" pitchFamily="34" charset="0"/>
+              <a:buChar char="•"/>
+            </a:pPr>
+            <a:r>
+              <a:rPr lang="en-US" sz="800" dirty="0">
+                <a:solidFill>
+                  <a:schemeClr val="bg2">
+                    <a:lumMod val="10000"/>
+                  </a:schemeClr>
+                </a:solidFill>
+              </a:rPr>
+              <a:t>Client Details Index</a:t>
+            </a:r>
+          </a:p>
+          <a:p>
+            <a:pPr marL="171450" indent="-171450">
+              <a:buFont typeface="Arial" panose="020B0604020202020204" pitchFamily="34" charset="0"/>
+              <a:buChar char="•"/>
+            </a:pPr>
+            <a:r>
+              <a:rPr lang="en-US" sz="800" dirty="0">
+                <a:solidFill>
+                  <a:schemeClr val="bg2">
+                    <a:lumMod val="10000"/>
+                  </a:schemeClr>
+                </a:solidFill>
+              </a:rPr>
+              <a:t>Display infographic for client details index based on filter</a:t>
             </a:r>
           </a:p>
         </p:txBody>
@@ -3424,8 +3718,8 @@
         </p:nvSpPr>
         <p:spPr>
           <a:xfrm>
-            <a:off x="6229602" y="2506243"/>
-            <a:ext cx="2636101" cy="1284170"/>
+            <a:off x="6371786" y="3117503"/>
+            <a:ext cx="1136397" cy="668843"/>
           </a:xfrm>
           <a:prstGeom prst="roundRect">
             <a:avLst/>
@@ -3465,14 +3759,22 @@
           <a:lstStyle/>
           <a:p>
             <a:r>
-              <a:rPr lang="en-US" sz="1000" dirty="0">
-                <a:solidFill>
-                  <a:srgbClr val="000000"/>
-                </a:solidFill>
-              </a:rPr>
-              <a:t>View summary and overview of latest analysis on dashboard</a:t>
-            </a:r>
-            <a:endParaRPr lang="en-US" sz="1000" dirty="0"/>
+              <a:rPr lang="en-US" sz="800" u="sng" dirty="0">
+                <a:solidFill>
+                  <a:schemeClr val="bg2">
+                    <a:lumMod val="10000"/>
+                  </a:schemeClr>
+                </a:solidFill>
+              </a:rPr>
+              <a:t>Dashboard</a:t>
+            </a:r>
+            <a:endParaRPr lang="en-US" sz="800" dirty="0">
+              <a:solidFill>
+                <a:schemeClr val="bg2">
+                  <a:lumMod val="10000"/>
+                </a:schemeClr>
+              </a:solidFill>
+            </a:endParaRPr>
           </a:p>
           <a:p>
             <a:pPr marL="171450" indent="-171450">
@@ -3480,14 +3782,25 @@
               <a:buChar char="•"/>
             </a:pPr>
             <a:r>
-              <a:rPr lang="en-US" sz="1000" dirty="0">
-                <a:solidFill>
-                  <a:srgbClr val="000000"/>
-                </a:solidFill>
-              </a:rPr>
-              <a:t>Visa and Medical patients for the past 6 months</a:t>
-            </a:r>
-            <a:endParaRPr lang="en-US" sz="1000" dirty="0"/>
+              <a:rPr lang="en-US" sz="800" dirty="0" err="1">
+                <a:solidFill>
+                  <a:schemeClr val="bg2">
+                    <a:lumMod val="10000"/>
+                  </a:schemeClr>
+                </a:solidFill>
+              </a:rPr>
+              <a:t>Customise</a:t>
+            </a:r>
+            <a:r>
+              <a:rPr lang="en-US" sz="800" dirty="0">
+                <a:solidFill>
+                  <a:schemeClr val="bg2">
+                    <a:lumMod val="10000"/>
+                  </a:schemeClr>
+                </a:solidFill>
+              </a:rPr>
+              <a:t> display</a:t>
+            </a:r>
           </a:p>
           <a:p>
             <a:pPr marL="171450" indent="-171450">
@@ -3495,48 +3808,15 @@
               <a:buChar char="•"/>
             </a:pPr>
             <a:r>
-              <a:rPr lang="en-US" sz="1000" dirty="0">
-                <a:solidFill>
-                  <a:srgbClr val="000000"/>
-                </a:solidFill>
-              </a:rPr>
-              <a:t>Common types of visas requested</a:t>
-            </a:r>
-            <a:endParaRPr lang="en-US" sz="1000" dirty="0"/>
-          </a:p>
-          <a:p>
-            <a:pPr marL="171450" indent="-171450">
-              <a:buFont typeface="Arial" panose="020B0604020202020204" pitchFamily="34" charset="0"/>
-              <a:buChar char="•"/>
-            </a:pPr>
-            <a:r>
-              <a:rPr lang="en-US" sz="1000" dirty="0">
-                <a:solidFill>
-                  <a:srgbClr val="000000"/>
-                </a:solidFill>
-              </a:rPr>
-              <a:t>List of clients who visited the past month</a:t>
-            </a:r>
-            <a:endParaRPr lang="en-US" sz="1000" dirty="0"/>
-          </a:p>
-          <a:p>
-            <a:pPr marL="171450" indent="-171450">
-              <a:buFont typeface="Arial" panose="020B0604020202020204" pitchFamily="34" charset="0"/>
-              <a:buChar char="•"/>
-            </a:pPr>
-            <a:r>
-              <a:rPr lang="en-US" sz="1000" dirty="0">
-                <a:solidFill>
-                  <a:srgbClr val="000000"/>
-                </a:solidFill>
-              </a:rPr>
-              <a:t>Top 3 Doctors engaged</a:t>
-            </a:r>
-            <a:endParaRPr lang="en-US" sz="1000" dirty="0">
-              <a:solidFill>
-                <a:schemeClr val="tx1"/>
-              </a:solidFill>
-            </a:endParaRPr>
+              <a:rPr lang="en-US" sz="800" dirty="0">
+                <a:solidFill>
+                  <a:schemeClr val="bg2">
+                    <a:lumMod val="10000"/>
+                  </a:schemeClr>
+                </a:solidFill>
+              </a:rPr>
+              <a:t>Drag and drop</a:t>
+            </a:r>
           </a:p>
         </p:txBody>
       </p:sp>
@@ -3548,8 +3828,8 @@
         </p:nvSpPr>
         <p:spPr>
           <a:xfrm>
-            <a:off x="2952271" y="1602281"/>
-            <a:ext cx="2505123" cy="907414"/>
+            <a:off x="3001801" y="2680424"/>
+            <a:ext cx="2505123" cy="834166"/>
           </a:xfrm>
           <a:prstGeom prst="roundRect">
             <a:avLst/>
@@ -3589,42 +3869,104 @@
           <a:lstStyle/>
           <a:p>
             <a:r>
-              <a:rPr lang="en-US" sz="1000" dirty="0">
-                <a:solidFill>
-                  <a:sysClr val="windowText" lastClr="000000"/>
-                </a:solidFill>
-              </a:rPr>
-              <a:t>View analysis infographic – KPI </a:t>
-            </a:r>
-          </a:p>
-          <a:p>
-            <a:r>
-              <a:rPr lang="en-US" sz="1000" dirty="0">
-                <a:solidFill>
-                  <a:sysClr val="windowText" lastClr="000000"/>
-                </a:solidFill>
-              </a:rPr>
-              <a:t>Filter (Visa/ Medical Team)</a:t>
-            </a:r>
-          </a:p>
-          <a:p>
-            <a:r>
-              <a:rPr lang="en-US" sz="1000" dirty="0">
-                <a:solidFill>
-                  <a:sysClr val="windowText" lastClr="000000"/>
-                </a:solidFill>
-              </a:rPr>
-              <a:t>View analysis infographic</a:t>
-            </a:r>
-          </a:p>
-          <a:p>
-            <a:r>
-              <a:rPr lang="en-US" sz="1000" dirty="0">
-                <a:solidFill>
-                  <a:sysClr val="windowText" lastClr="000000"/>
-                </a:solidFill>
-              </a:rPr>
-              <a:t>Show changes from previous month/year</a:t>
+              <a:rPr lang="en-US" sz="800" u="sng" dirty="0">
+                <a:solidFill>
+                  <a:schemeClr val="bg2">
+                    <a:lumMod val="10000"/>
+                  </a:schemeClr>
+                </a:solidFill>
+              </a:rPr>
+              <a:t>Dashboard</a:t>
+            </a:r>
+            <a:r>
+              <a:rPr lang="en-US" sz="800" dirty="0">
+                <a:solidFill>
+                  <a:schemeClr val="bg2">
+                    <a:lumMod val="10000"/>
+                  </a:schemeClr>
+                </a:solidFill>
+              </a:rPr>
+              <a:t> </a:t>
+            </a:r>
+          </a:p>
+          <a:p>
+            <a:pPr marL="171450" indent="-171450">
+              <a:buFont typeface="Arial" panose="020B0604020202020204" pitchFamily="34" charset="0"/>
+              <a:buChar char="•"/>
+            </a:pPr>
+            <a:r>
+              <a:rPr lang="en-US" sz="800" dirty="0">
+                <a:solidFill>
+                  <a:schemeClr val="bg2">
+                    <a:lumMod val="10000"/>
+                  </a:schemeClr>
+                </a:solidFill>
+              </a:rPr>
+              <a:t>Summary and overview of latest reports</a:t>
+            </a:r>
+          </a:p>
+          <a:p>
+            <a:pPr marL="171450" indent="-171450">
+              <a:buFont typeface="Arial" panose="020B0604020202020204" pitchFamily="34" charset="0"/>
+              <a:buChar char="•"/>
+            </a:pPr>
+            <a:r>
+              <a:rPr lang="en-US" sz="800" dirty="0">
+                <a:solidFill>
+                  <a:schemeClr val="bg2">
+                    <a:lumMod val="10000"/>
+                  </a:schemeClr>
+                </a:solidFill>
+              </a:rPr>
+              <a:t>Visa and Medical patients for the past 12 months</a:t>
+            </a:r>
+          </a:p>
+          <a:p>
+            <a:pPr marL="171450" indent="-171450">
+              <a:buFont typeface="Arial" panose="020B0604020202020204" pitchFamily="34" charset="0"/>
+              <a:buChar char="•"/>
+            </a:pPr>
+            <a:r>
+              <a:rPr lang="en-US" sz="800" dirty="0">
+                <a:solidFill>
+                  <a:schemeClr val="bg2">
+                    <a:lumMod val="10000"/>
+                  </a:schemeClr>
+                </a:solidFill>
+              </a:rPr>
+              <a:t>Common types of visas requested</a:t>
+            </a:r>
+          </a:p>
+          <a:p>
+            <a:pPr marL="171450" indent="-171450">
+              <a:buFont typeface="Arial" panose="020B0604020202020204" pitchFamily="34" charset="0"/>
+              <a:buChar char="•"/>
+            </a:pPr>
+            <a:r>
+              <a:rPr lang="en-US" sz="800" dirty="0">
+                <a:solidFill>
+                  <a:schemeClr val="bg2">
+                    <a:lumMod val="10000"/>
+                  </a:schemeClr>
+                </a:solidFill>
+              </a:rPr>
+              <a:t>Top 3 Doctors</a:t>
+            </a:r>
+          </a:p>
+          <a:p>
+            <a:pPr marL="171450" indent="-171450">
+              <a:buFont typeface="Arial" panose="020B0604020202020204" pitchFamily="34" charset="0"/>
+              <a:buChar char="•"/>
+            </a:pPr>
+            <a:r>
+              <a:rPr lang="en-US" sz="800" dirty="0">
+                <a:solidFill>
+                  <a:schemeClr val="bg2">
+                    <a:lumMod val="10000"/>
+                  </a:schemeClr>
+                </a:solidFill>
+              </a:rPr>
+              <a:t>Top 5 Referral Sources</a:t>
             </a:r>
           </a:p>
         </p:txBody>
@@ -3637,8 +3979,8 @@
         </p:nvSpPr>
         <p:spPr>
           <a:xfrm>
-            <a:off x="2952271" y="2740614"/>
-            <a:ext cx="2772668" cy="850725"/>
+            <a:off x="3027112" y="1400886"/>
+            <a:ext cx="1726423" cy="1053316"/>
           </a:xfrm>
           <a:prstGeom prst="roundRect">
             <a:avLst/>
@@ -3678,32 +4020,133 @@
           <a:lstStyle/>
           <a:p>
             <a:r>
-              <a:rPr lang="en-US" sz="1000" dirty="0">
-                <a:solidFill>
-                  <a:schemeClr val="tx1"/>
-                </a:solidFill>
-              </a:rPr>
-              <a:t>Choose email from existing templates</a:t>
-            </a:r>
-          </a:p>
-          <a:p>
-            <a:r>
-              <a:rPr lang="en-US" sz="1000" dirty="0">
-                <a:solidFill>
-                  <a:schemeClr val="tx1"/>
-                </a:solidFill>
-              </a:rPr>
-              <a:t>Edit email with preview &amp; data from database</a:t>
-            </a:r>
-          </a:p>
-          <a:p>
-            <a:r>
-              <a:rPr lang="en-US" sz="1000" dirty="0">
-                <a:solidFill>
-                  <a:schemeClr val="tx1"/>
-                </a:solidFill>
-              </a:rPr>
-              <a:t>Send email to ulink staff based on selected patients</a:t>
+              <a:rPr lang="en-US" sz="800" u="sng" dirty="0">
+                <a:solidFill>
+                  <a:schemeClr val="bg2">
+                    <a:lumMod val="10000"/>
+                  </a:schemeClr>
+                </a:solidFill>
+              </a:rPr>
+              <a:t>Text Editor</a:t>
+            </a:r>
+            <a:endParaRPr lang="en-US" sz="800" dirty="0">
+              <a:solidFill>
+                <a:schemeClr val="bg2">
+                  <a:lumMod val="10000"/>
+                </a:schemeClr>
+              </a:solidFill>
+            </a:endParaRPr>
+          </a:p>
+          <a:p>
+            <a:pPr marL="171450" indent="-171450">
+              <a:buFont typeface="Arial" panose="020B0604020202020204" pitchFamily="34" charset="0"/>
+              <a:buChar char="•"/>
+            </a:pPr>
+            <a:r>
+              <a:rPr lang="en-US" sz="800" dirty="0">
+                <a:solidFill>
+                  <a:schemeClr val="bg2">
+                    <a:lumMod val="10000"/>
+                  </a:schemeClr>
+                </a:solidFill>
+              </a:rPr>
+              <a:t>Edit email with editing features</a:t>
+            </a:r>
+          </a:p>
+          <a:p>
+            <a:pPr marL="171450" indent="-171450">
+              <a:buFont typeface="Arial" panose="020B0604020202020204" pitchFamily="34" charset="0"/>
+              <a:buChar char="•"/>
+            </a:pPr>
+            <a:r>
+              <a:rPr lang="en-US" sz="800" dirty="0">
+                <a:solidFill>
+                  <a:schemeClr val="bg2">
+                    <a:lumMod val="10000"/>
+                  </a:schemeClr>
+                </a:solidFill>
+              </a:rPr>
+              <a:t>Create Template</a:t>
+            </a:r>
+          </a:p>
+          <a:p>
+            <a:pPr marL="171450" indent="-171450">
+              <a:buFont typeface="Arial" panose="020B0604020202020204" pitchFamily="34" charset="0"/>
+              <a:buChar char="•"/>
+            </a:pPr>
+            <a:r>
+              <a:rPr lang="en-US" sz="800" dirty="0">
+                <a:solidFill>
+                  <a:schemeClr val="bg2">
+                    <a:lumMod val="10000"/>
+                  </a:schemeClr>
+                </a:solidFill>
+              </a:rPr>
+              <a:t>View Template</a:t>
+            </a:r>
+          </a:p>
+          <a:p>
+            <a:pPr marL="171450" indent="-171450">
+              <a:buFont typeface="Arial" panose="020B0604020202020204" pitchFamily="34" charset="0"/>
+              <a:buChar char="•"/>
+            </a:pPr>
+            <a:r>
+              <a:rPr lang="en-US" sz="800" dirty="0">
+                <a:solidFill>
+                  <a:schemeClr val="bg2">
+                    <a:lumMod val="10000"/>
+                  </a:schemeClr>
+                </a:solidFill>
+              </a:rPr>
+              <a:t>Delete Template</a:t>
+            </a:r>
+          </a:p>
+          <a:p>
+            <a:pPr marL="171450" indent="-171450">
+              <a:buFont typeface="Arial" panose="020B0604020202020204" pitchFamily="34" charset="0"/>
+              <a:buChar char="•"/>
+            </a:pPr>
+            <a:r>
+              <a:rPr lang="en-US" sz="800" dirty="0">
+                <a:solidFill>
+                  <a:schemeClr val="bg2">
+                    <a:lumMod val="10000"/>
+                  </a:schemeClr>
+                </a:solidFill>
+              </a:rPr>
+              <a:t>Upload image</a:t>
+            </a:r>
+          </a:p>
+          <a:p>
+            <a:pPr marL="171450" indent="-171450">
+              <a:buFont typeface="Arial" panose="020B0604020202020204" pitchFamily="34" charset="0"/>
+              <a:buChar char="•"/>
+            </a:pPr>
+            <a:r>
+              <a:rPr lang="en-US" sz="800" dirty="0">
+                <a:solidFill>
+                  <a:schemeClr val="bg2">
+                    <a:lumMod val="10000"/>
+                  </a:schemeClr>
+                </a:solidFill>
+              </a:rPr>
+              <a:t>Allow user to add additional </a:t>
+            </a:r>
+          </a:p>
+          <a:p>
+            <a:pPr marL="171450" indent="-171450">
+              <a:buFont typeface="Arial" panose="020B0604020202020204" pitchFamily="34" charset="0"/>
+              <a:buChar char="•"/>
+            </a:pPr>
+            <a:r>
+              <a:rPr lang="en-US" sz="800" dirty="0">
+                <a:solidFill>
+                  <a:schemeClr val="bg2">
+                    <a:lumMod val="10000"/>
+                  </a:schemeClr>
+                </a:solidFill>
+              </a:rPr>
+              <a:t>email recipients</a:t>
             </a:r>
           </a:p>
         </p:txBody>
@@ -3716,8 +4159,8 @@
         </p:nvSpPr>
         <p:spPr>
           <a:xfrm>
-            <a:off x="2952271" y="3790412"/>
-            <a:ext cx="2081901" cy="464220"/>
+            <a:off x="6371786" y="2048004"/>
+            <a:ext cx="2081901" cy="921085"/>
           </a:xfrm>
           <a:prstGeom prst="roundRect">
             <a:avLst/>
@@ -3756,180 +4199,54 @@
           </a:bodyPr>
           <a:lstStyle/>
           <a:p>
-            <a:endParaRPr lang="en-US" sz="1000" dirty="0">
+            <a:r>
+              <a:rPr lang="en-US" sz="800" u="sng" dirty="0">
+                <a:solidFill>
+                  <a:schemeClr val="bg2">
+                    <a:lumMod val="10000"/>
+                  </a:schemeClr>
+                </a:solidFill>
+              </a:rPr>
+              <a:t>Export</a:t>
+            </a:r>
+            <a:endParaRPr lang="en-US" sz="800" dirty="0">
               <a:solidFill>
-                <a:schemeClr val="tx1"/>
+                <a:schemeClr val="bg2">
+                  <a:lumMod val="10000"/>
+                </a:schemeClr>
               </a:solidFill>
             </a:endParaRPr>
           </a:p>
           <a:p>
-            <a:r>
-              <a:rPr lang="en-US" sz="1000" dirty="0">
-                <a:solidFill>
-                  <a:schemeClr val="tx1"/>
-                </a:solidFill>
-              </a:rPr>
-              <a:t>Search for specific information in the entire application</a:t>
-            </a:r>
-            <a:br>
-              <a:rPr lang="en-US" sz="1000" dirty="0">
-                <a:solidFill>
-                  <a:schemeClr val="tx1"/>
-                </a:solidFill>
-              </a:rPr>
-            </a:br>
-            <a:endParaRPr lang="en-US" sz="1000" dirty="0">
-              <a:solidFill>
-                <a:schemeClr val="tx1"/>
-              </a:solidFill>
-            </a:endParaRPr>
-          </a:p>
-        </p:txBody>
-      </p:sp>
-      <p:sp>
-        <p:nvSpPr>
-          <p:cNvPr id="16" name="Rounded Rectangle 15"/>
-          <p:cNvSpPr/>
-          <p:nvPr/>
-        </p:nvSpPr>
-        <p:spPr>
-          <a:xfrm>
-            <a:off x="6268278" y="310861"/>
-            <a:ext cx="2279374" cy="1201139"/>
-          </a:xfrm>
-          <a:prstGeom prst="roundRect">
-            <a:avLst/>
-          </a:prstGeom>
-          <a:solidFill>
-            <a:srgbClr val="D6B3EB"/>
-          </a:solidFill>
-          <a:ln>
-            <a:solidFill>
-              <a:schemeClr val="tx1"/>
-            </a:solidFill>
-          </a:ln>
-        </p:spPr>
-        <p:style>
-          <a:lnRef idx="2">
-            <a:schemeClr val="accent1">
-              <a:shade val="50000"/>
-            </a:schemeClr>
-          </a:lnRef>
-          <a:fillRef idx="1">
-            <a:schemeClr val="accent1"/>
-          </a:fillRef>
-          <a:effectRef idx="0">
-            <a:schemeClr val="accent1"/>
-          </a:effectRef>
-          <a:fontRef idx="minor">
-            <a:schemeClr val="lt1"/>
-          </a:fontRef>
-        </p:style>
-        <p:txBody>
-          <a:bodyPr rot="0" spcFirstLastPara="0" vertOverflow="overflow" horzOverflow="overflow" vert="horz" wrap="square" lIns="68580" tIns="34290" rIns="68580" bIns="34290" numCol="1" spcCol="0" rtlCol="0" fromWordArt="0" anchor="ctr" anchorCtr="0" forceAA="0" compatLnSpc="1">
-            <a:prstTxWarp prst="textNoShape">
-              <a:avLst/>
-            </a:prstTxWarp>
-            <a:noAutofit/>
-          </a:bodyPr>
-          <a:lstStyle/>
-          <a:p>
-            <a:r>
-              <a:rPr lang="en-US" sz="1000" dirty="0">
-                <a:solidFill>
-                  <a:sysClr val="windowText" lastClr="000000"/>
-                </a:solidFill>
-              </a:rPr>
-              <a:t>Sorting of different columns</a:t>
-            </a:r>
-          </a:p>
-          <a:p>
-            <a:r>
-              <a:rPr lang="en-US" sz="1000" dirty="0">
-                <a:solidFill>
-                  <a:sysClr val="windowText" lastClr="000000"/>
-                </a:solidFill>
-              </a:rPr>
-              <a:t>View list (Filter by Visa/ Medical)</a:t>
-            </a:r>
-          </a:p>
-          <a:p>
-            <a:r>
-              <a:rPr lang="en-US" sz="1000" dirty="0">
-                <a:solidFill>
-                  <a:sysClr val="windowText" lastClr="000000"/>
-                </a:solidFill>
-              </a:rPr>
-              <a:t>View Client Profile (Basic information and possible illnesses/screenings recommendations)</a:t>
-            </a:r>
-          </a:p>
-          <a:p>
-            <a:r>
-              <a:rPr lang="en-US" sz="1000" dirty="0">
-                <a:solidFill>
-                  <a:sysClr val="windowText" lastClr="000000"/>
-                </a:solidFill>
-              </a:rPr>
-              <a:t>View appointments and admissions</a:t>
-            </a:r>
-          </a:p>
-        </p:txBody>
-      </p:sp>
-      <p:sp>
-        <p:nvSpPr>
-          <p:cNvPr id="18" name="Rounded Rectangle 17"/>
-          <p:cNvSpPr/>
-          <p:nvPr/>
-        </p:nvSpPr>
-        <p:spPr>
-          <a:xfrm>
-            <a:off x="403777" y="2877113"/>
-            <a:ext cx="1658677" cy="509334"/>
-          </a:xfrm>
-          <a:prstGeom prst="roundRect">
-            <a:avLst/>
-          </a:prstGeom>
-          <a:solidFill>
-            <a:srgbClr val="F77F07"/>
-          </a:solidFill>
-          <a:ln>
-            <a:solidFill>
-              <a:schemeClr val="tx1"/>
-            </a:solidFill>
-          </a:ln>
-        </p:spPr>
-        <p:style>
-          <a:lnRef idx="2">
-            <a:schemeClr val="accent1">
-              <a:shade val="50000"/>
-            </a:schemeClr>
-          </a:lnRef>
-          <a:fillRef idx="1">
-            <a:schemeClr val="accent1"/>
-          </a:fillRef>
-          <a:effectRef idx="0">
-            <a:schemeClr val="accent1"/>
-          </a:effectRef>
-          <a:fontRef idx="minor">
-            <a:schemeClr val="lt1"/>
-          </a:fontRef>
-        </p:style>
-        <p:txBody>
-          <a:bodyPr rot="0" spcFirstLastPara="0" vertOverflow="overflow" horzOverflow="overflow" vert="horz" wrap="square" lIns="68580" tIns="34290" rIns="68580" bIns="34290" numCol="1" spcCol="0" rtlCol="0" fromWordArt="0" anchor="ctr" anchorCtr="0" forceAA="0" compatLnSpc="1">
-            <a:prstTxWarp prst="textNoShape">
-              <a:avLst/>
-            </a:prstTxWarp>
-            <a:noAutofit/>
-          </a:bodyPr>
-          <a:lstStyle/>
-          <a:p>
-            <a:r>
-              <a:rPr lang="en-US" sz="1000" dirty="0">
-                <a:solidFill>
-                  <a:schemeClr val="tx1"/>
-                </a:solidFill>
-              </a:rPr>
-              <a:t>Export analysis reports for reporting purposes</a:t>
+            <a:pPr marL="171450" indent="-171450">
+              <a:buFont typeface="Arial" panose="020B0604020202020204" pitchFamily="34" charset="0"/>
+              <a:buChar char="•"/>
+            </a:pPr>
+            <a:r>
+              <a:rPr lang="en-US" sz="800" dirty="0">
+                <a:solidFill>
+                  <a:schemeClr val="bg2">
+                    <a:lumMod val="10000"/>
+                  </a:schemeClr>
+                </a:solidFill>
+              </a:rPr>
+              <a:t>Export dashboard/ performance reports for reporting purposes in PDF Format</a:t>
+            </a:r>
+          </a:p>
+          <a:p>
+            <a:pPr marL="171450" indent="-171450">
+              <a:buFont typeface="Arial" panose="020B0604020202020204" pitchFamily="34" charset="0"/>
+              <a:buChar char="•"/>
+            </a:pPr>
+            <a:r>
+              <a:rPr lang="en-US" sz="800" dirty="0">
+                <a:solidFill>
+                  <a:schemeClr val="bg2">
+                    <a:lumMod val="10000"/>
+                  </a:schemeClr>
+                </a:solidFill>
+              </a:rPr>
+              <a:t>Clients’ emails for each screening</a:t>
             </a:r>
           </a:p>
         </p:txBody>
@@ -3942,8 +4259,8 @@
         </p:nvSpPr>
         <p:spPr>
           <a:xfrm>
-            <a:off x="4862018" y="6113521"/>
-            <a:ext cx="1451263" cy="628558"/>
+            <a:off x="4915972" y="5533148"/>
+            <a:ext cx="1406260" cy="628558"/>
           </a:xfrm>
           <a:prstGeom prst="roundRect">
             <a:avLst/>
@@ -3986,22 +4303,26 @@
           <a:lstStyle/>
           <a:p>
             <a:r>
-              <a:rPr lang="en-US" sz="1000" dirty="0">
-                <a:solidFill>
-                  <a:sysClr val="windowText" lastClr="000000"/>
-                </a:solidFill>
-              </a:rPr>
-              <a:t>Manage accounts</a:t>
-            </a:r>
-          </a:p>
-          <a:p>
-            <a:r>
-              <a:rPr lang="en-US" sz="1000" dirty="0">
-                <a:solidFill>
-                  <a:sysClr val="windowText" lastClr="000000"/>
-                </a:solidFill>
-              </a:rPr>
-              <a:t>Create/ Delete account</a:t>
+              <a:rPr lang="en-US" sz="800" dirty="0">
+                <a:solidFill>
+                  <a:schemeClr val="bg2">
+                    <a:lumMod val="10000"/>
+                  </a:schemeClr>
+                </a:solidFill>
+              </a:rPr>
+              <a:t>Account Management (reset password)</a:t>
+            </a:r>
+          </a:p>
+          <a:p>
+            <a:r>
+              <a:rPr lang="en-US" sz="800" dirty="0">
+                <a:solidFill>
+                  <a:schemeClr val="bg2">
+                    <a:lumMod val="10000"/>
+                  </a:schemeClr>
+                </a:solidFill>
+              </a:rPr>
+              <a:t>Create/ Delete account by administrator</a:t>
             </a:r>
           </a:p>
         </p:txBody>
@@ -4021,7 +4342,7 @@
         </p:blipFill>
         <p:spPr>
           <a:xfrm>
-            <a:off x="2062454" y="4889343"/>
+            <a:off x="2157358" y="4501971"/>
             <a:ext cx="417362" cy="541524"/>
           </a:xfrm>
           <a:prstGeom prst="rect">
@@ -4045,7 +4366,7 @@
         </p:blipFill>
         <p:spPr>
           <a:xfrm>
-            <a:off x="3090825" y="4940401"/>
+            <a:off x="3221991" y="4550949"/>
             <a:ext cx="447675" cy="476250"/>
           </a:xfrm>
           <a:prstGeom prst="rect">
@@ -4069,7 +4390,7 @@
         </p:blipFill>
         <p:spPr>
           <a:xfrm>
-            <a:off x="4288169" y="4964142"/>
+            <a:off x="4254363" y="4529145"/>
             <a:ext cx="390525" cy="466725"/>
           </a:xfrm>
           <a:prstGeom prst="rect">
@@ -4093,7 +4414,7 @@
         </p:blipFill>
         <p:spPr>
           <a:xfrm>
-            <a:off x="5457394" y="4961194"/>
+            <a:off x="5367381" y="4490836"/>
             <a:ext cx="428625" cy="514350"/>
           </a:xfrm>
           <a:prstGeom prst="rect">
@@ -4109,8 +4430,8 @@
         </p:nvSpPr>
         <p:spPr>
           <a:xfrm>
-            <a:off x="92765" y="119271"/>
-            <a:ext cx="8865705" cy="4306956"/>
+            <a:off x="279400" y="119271"/>
+            <a:ext cx="8343900" cy="3828877"/>
           </a:xfrm>
           <a:prstGeom prst="rect">
             <a:avLst/>
@@ -4155,7 +4476,7 @@
         </p:nvSpPr>
         <p:spPr>
           <a:xfrm>
-            <a:off x="1954350" y="5352433"/>
+            <a:off x="2051714" y="4954111"/>
             <a:ext cx="628650" cy="246221"/>
           </a:xfrm>
           <a:prstGeom prst="rect">
@@ -4184,7 +4505,7 @@
         </p:nvSpPr>
         <p:spPr>
           <a:xfrm>
-            <a:off x="3086195" y="5352433"/>
+            <a:off x="3256684" y="4970038"/>
             <a:ext cx="518565" cy="246221"/>
           </a:xfrm>
           <a:prstGeom prst="rect">
@@ -4213,7 +4534,7 @@
         </p:nvSpPr>
         <p:spPr>
           <a:xfrm>
-            <a:off x="4182427" y="5352433"/>
+            <a:off x="4144584" y="4959365"/>
             <a:ext cx="631039" cy="246221"/>
           </a:xfrm>
           <a:prstGeom prst="rect">
@@ -4242,7 +4563,7 @@
         </p:nvSpPr>
         <p:spPr>
           <a:xfrm>
-            <a:off x="5372348" y="5414247"/>
+            <a:off x="5303583" y="4954111"/>
             <a:ext cx="631039" cy="246221"/>
           </a:xfrm>
           <a:prstGeom prst="rect">
@@ -4272,9 +4593,9 @@
           <p:nvPr/>
         </p:nvCxnSpPr>
         <p:spPr>
-          <a:xfrm flipH="1" flipV="1">
-            <a:off x="2268675" y="4421492"/>
-            <a:ext cx="2460" cy="467851"/>
+          <a:xfrm flipV="1">
+            <a:off x="2366039" y="3958544"/>
+            <a:ext cx="23199" cy="543427"/>
           </a:xfrm>
           <a:prstGeom prst="straightConnector1">
             <a:avLst/>
@@ -4310,9 +4631,9 @@
           <p:nvPr/>
         </p:nvCxnSpPr>
         <p:spPr>
-          <a:xfrm flipH="1" flipV="1">
-            <a:off x="3314662" y="4418605"/>
-            <a:ext cx="1" cy="521796"/>
+          <a:xfrm flipV="1">
+            <a:off x="3445829" y="3955443"/>
+            <a:ext cx="7125" cy="595506"/>
           </a:xfrm>
           <a:prstGeom prst="straightConnector1">
             <a:avLst/>
@@ -4342,13 +4663,16 @@
       <p:cxnSp>
         <p:nvCxnSpPr>
           <p:cNvPr id="44" name="Straight Arrow Connector 43"/>
-          <p:cNvCxnSpPr/>
+          <p:cNvCxnSpPr>
+            <a:stCxn id="24" idx="0"/>
+            <a:endCxn id="26" idx="2"/>
+          </p:cNvCxnSpPr>
           <p:nvPr/>
         </p:nvCxnSpPr>
         <p:spPr>
-          <a:xfrm flipH="1" flipV="1">
-            <a:off x="4447044" y="4396248"/>
-            <a:ext cx="1" cy="521796"/>
+          <a:xfrm flipV="1">
+            <a:off x="4449626" y="3948148"/>
+            <a:ext cx="1724" cy="580997"/>
           </a:xfrm>
           <a:prstGeom prst="straightConnector1">
             <a:avLst/>
@@ -4378,13 +4702,15 @@
       <p:cxnSp>
         <p:nvCxnSpPr>
           <p:cNvPr id="45" name="Straight Arrow Connector 44"/>
-          <p:cNvCxnSpPr/>
+          <p:cNvCxnSpPr>
+            <a:stCxn id="25" idx="0"/>
+          </p:cNvCxnSpPr>
           <p:nvPr/>
         </p:nvCxnSpPr>
         <p:spPr>
           <a:xfrm flipH="1" flipV="1">
-            <a:off x="5587650" y="4411238"/>
-            <a:ext cx="1" cy="521796"/>
+            <a:off x="5581693" y="3955443"/>
+            <a:ext cx="1" cy="535393"/>
           </a:xfrm>
           <a:prstGeom prst="straightConnector1">
             <a:avLst/>
@@ -4415,14 +4741,15 @@
         <p:nvCxnSpPr>
           <p:cNvPr id="46" name="Straight Arrow Connector 45"/>
           <p:cNvCxnSpPr>
+            <a:stCxn id="30" idx="2"/>
             <a:endCxn id="21" idx="0"/>
           </p:cNvCxnSpPr>
           <p:nvPr/>
         </p:nvCxnSpPr>
         <p:spPr>
-          <a:xfrm>
-            <a:off x="5587650" y="5628016"/>
-            <a:ext cx="0" cy="485505"/>
+          <a:xfrm flipH="1">
+            <a:off x="5619102" y="5200332"/>
+            <a:ext cx="1" cy="332816"/>
           </a:xfrm>
           <a:prstGeom prst="straightConnector1">
             <a:avLst/>

</xml_diff>